<commit_message>
Updated my PPT to better reflect my presentation
Updated PPT
</commit_message>
<xml_diff>
--- a/MatthewLaneConnect4Presentation.pptx
+++ b/MatthewLaneConnect4Presentation.pptx
@@ -6,6 +6,8 @@
   </p:sldMasterIdLst>
   <p:sldIdLst>
     <p:sldId id="256" r:id="rId2"/>
+    <p:sldId id="257" r:id="rId3"/>
+    <p:sldId id="258" r:id="rId4"/>
   </p:sldIdLst>
   <p:sldSz cx="12192000" cy="6858000"/>
   <p:notesSz cx="6858000" cy="9144000"/>
@@ -104,6 +106,11 @@
       </a:defRPr>
     </a:lvl9pPr>
   </p:defaultTextStyle>
+  <p:extLst>
+    <p:ext uri="{EFAFB233-063F-42B5-8137-9DF3F51BA10A}">
+      <p15:sldGuideLst xmlns:p15="http://schemas.microsoft.com/office/powerpoint/2012/main"/>
+    </p:ext>
+  </p:extLst>
 </p:presentation>
 </file>
 
@@ -422,7 +429,7 @@
             <a:fld id="{1449AA12-8195-4182-A7AC-2E7E59DFBDAF}" type="datetimeFigureOut">
               <a:rPr lang="en-US" smtClean="0"/>
               <a:pPr algn="r"/>
-              <a:t>4/26/2022</a:t>
+              <a:t>5/1/2022</a:t>
             </a:fld>
             <a:endParaRPr lang="en-US"/>
           </a:p>
@@ -638,7 +645,7 @@
           <a:p>
             <a:fld id="{1449AA12-8195-4182-A7AC-2E7E59DFBDAF}" type="datetimeFigureOut">
               <a:rPr lang="en-US" smtClean="0"/>
-              <a:t>4/26/2022</a:t>
+              <a:t>5/1/2022</a:t>
             </a:fld>
             <a:endParaRPr lang="en-US"/>
           </a:p>
@@ -1010,7 +1017,7 @@
           <a:p>
             <a:fld id="{1449AA12-8195-4182-A7AC-2E7E59DFBDAF}" type="datetimeFigureOut">
               <a:rPr lang="en-US" smtClean="0"/>
-              <a:t>4/26/2022</a:t>
+              <a:t>5/1/2022</a:t>
             </a:fld>
             <a:endParaRPr lang="en-US"/>
           </a:p>
@@ -1372,7 +1379,7 @@
           <a:p>
             <a:fld id="{1449AA12-8195-4182-A7AC-2E7E59DFBDAF}" type="datetimeFigureOut">
               <a:rPr lang="en-US" smtClean="0"/>
-              <a:t>4/26/2022</a:t>
+              <a:t>5/1/2022</a:t>
             </a:fld>
             <a:endParaRPr lang="en-US"/>
           </a:p>
@@ -1812,7 +1819,7 @@
           <a:p>
             <a:fld id="{1449AA12-8195-4182-A7AC-2E7E59DFBDAF}" type="datetimeFigureOut">
               <a:rPr lang="en-US" smtClean="0"/>
-              <a:t>4/26/2022</a:t>
+              <a:t>5/1/2022</a:t>
             </a:fld>
             <a:endParaRPr lang="en-US"/>
           </a:p>
@@ -2252,7 +2259,7 @@
           <a:p>
             <a:fld id="{1449AA12-8195-4182-A7AC-2E7E59DFBDAF}" type="datetimeFigureOut">
               <a:rPr lang="en-US" smtClean="0"/>
-              <a:t>4/26/2022</a:t>
+              <a:t>5/1/2022</a:t>
             </a:fld>
             <a:endParaRPr lang="en-US"/>
           </a:p>
@@ -2860,7 +2867,7 @@
           <a:p>
             <a:fld id="{1449AA12-8195-4182-A7AC-2E7E59DFBDAF}" type="datetimeFigureOut">
               <a:rPr lang="en-US" smtClean="0"/>
-              <a:t>4/26/2022</a:t>
+              <a:t>5/1/2022</a:t>
             </a:fld>
             <a:endParaRPr lang="en-US"/>
           </a:p>
@@ -3165,7 +3172,7 @@
           <a:p>
             <a:fld id="{1449AA12-8195-4182-A7AC-2E7E59DFBDAF}" type="datetimeFigureOut">
               <a:rPr lang="en-US" smtClean="0"/>
-              <a:t>4/26/2022</a:t>
+              <a:t>5/1/2022</a:t>
             </a:fld>
             <a:endParaRPr lang="en-US"/>
           </a:p>
@@ -3442,7 +3449,7 @@
           <a:p>
             <a:fld id="{1449AA12-8195-4182-A7AC-2E7E59DFBDAF}" type="datetimeFigureOut">
               <a:rPr lang="en-US" smtClean="0"/>
-              <a:t>4/26/2022</a:t>
+              <a:t>5/1/2022</a:t>
             </a:fld>
             <a:endParaRPr lang="en-US"/>
           </a:p>
@@ -3919,7 +3926,7 @@
           <a:p>
             <a:fld id="{1449AA12-8195-4182-A7AC-2E7E59DFBDAF}" type="datetimeFigureOut">
               <a:rPr lang="en-US" smtClean="0"/>
-              <a:t>4/26/2022</a:t>
+              <a:t>5/1/2022</a:t>
             </a:fld>
             <a:endParaRPr lang="en-US"/>
           </a:p>
@@ -4374,7 +4381,7 @@
           <a:p>
             <a:fld id="{1449AA12-8195-4182-A7AC-2E7E59DFBDAF}" type="datetimeFigureOut">
               <a:rPr lang="en-US" smtClean="0"/>
-              <a:t>4/26/2022</a:t>
+              <a:t>5/1/2022</a:t>
             </a:fld>
             <a:endParaRPr lang="en-US"/>
           </a:p>
@@ -4780,7 +4787,7 @@
             <a:fld id="{1449AA12-8195-4182-A7AC-2E7E59DFBDAF}" type="datetimeFigureOut">
               <a:rPr lang="en-US" smtClean="0"/>
               <a:pPr/>
-              <a:t>4/26/2022</a:t>
+              <a:t>5/1/2022</a:t>
             </a:fld>
             <a:endParaRPr lang="en-US"/>
           </a:p>
@@ -5496,14 +5503,14 @@
           <a:lstStyle/>
           <a:p>
             <a:r>
-              <a:rPr lang="en-US"/>
+              <a:rPr lang="en-US" dirty="0"/>
               <a:t>Connect 4 Python Game</a:t>
             </a:r>
             <a:br>
-              <a:rPr lang="en-US"/>
+              <a:rPr lang="en-US" dirty="0"/>
             </a:br>
             <a:r>
-              <a:rPr lang="en-US"/>
+              <a:rPr lang="en-US" dirty="0"/>
               <a:t>Matthew Lane</a:t>
             </a:r>
           </a:p>
@@ -5545,7 +5552,7 @@
               <a:buChar char="•"/>
             </a:pPr>
             <a:r>
-              <a:rPr lang="en-US" sz="1900"/>
+              <a:rPr lang="en-US" sz="1900" dirty="0"/>
               <a:t>This game of Connect 4 allows two players to compete against each other in a race to Connect 4 pieces in either a diagonal, horizontal, or vertical formation!</a:t>
             </a:r>
           </a:p>
@@ -5555,7 +5562,7 @@
                 <a:spcPct val="100000"/>
               </a:lnSpc>
             </a:pPr>
-            <a:endParaRPr lang="en-US" sz="1900"/>
+            <a:endParaRPr lang="en-US" sz="1900" dirty="0"/>
           </a:p>
         </p:txBody>
       </p:sp>
@@ -5617,9 +5624,6 @@
                     <p:cTn id="3" fill="hold">
                       <p:stCondLst>
                         <p:cond delay="indefinite"/>
-                        <p:cond evt="onBegin" delay="0">
-                          <p:tn val="2"/>
-                        </p:cond>
                       </p:stCondLst>
                       <p:childTnLst>
                         <p:par>
@@ -5629,13 +5633,10 @@
                             </p:stCondLst>
                             <p:childTnLst>
                               <p:par>
-                                <p:cTn id="5" presetID="10" presetClass="entr" presetSubtype="0" fill="hold" grpId="0" nodeType="withEffect">
+                                <p:cTn id="5" presetID="2" presetClass="entr" presetSubtype="4" fill="hold" grpId="0" nodeType="clickEffect">
                                   <p:stCondLst>
-                                    <p:cond delay="1500"/>
+                                    <p:cond delay="0"/>
                                   </p:stCondLst>
-                                  <p:iterate>
-                                    <p:tmPct val="10000"/>
-                                  </p:iterate>
                                   <p:childTnLst>
                                     <p:set>
                                       <p:cBhvr>
@@ -5659,9 +5660,9 @@
                                         <p:strVal val="visible"/>
                                       </p:to>
                                     </p:set>
-                                    <p:animEffect transition="in" filter="fade">
-                                      <p:cBhvr>
-                                        <p:cTn id="7" dur="700"/>
+                                    <p:anim calcmode="lin" valueType="num">
+                                      <p:cBhvr additive="base">
+                                        <p:cTn id="7" dur="500" fill="hold"/>
                                         <p:tgtEl>
                                           <p:spTgt spid="3">
                                             <p:txEl>
@@ -5669,23 +5670,80 @@
                                             </p:txEl>
                                           </p:spTgt>
                                         </p:tgtEl>
+                                        <p:attrNameLst>
+                                          <p:attrName>ppt_x</p:attrName>
+                                        </p:attrNameLst>
                                       </p:cBhvr>
-                                    </p:animEffect>
+                                      <p:tavLst>
+                                        <p:tav tm="0">
+                                          <p:val>
+                                            <p:strVal val="#ppt_x"/>
+                                          </p:val>
+                                        </p:tav>
+                                        <p:tav tm="100000">
+                                          <p:val>
+                                            <p:strVal val="#ppt_x"/>
+                                          </p:val>
+                                        </p:tav>
+                                      </p:tavLst>
+                                    </p:anim>
+                                    <p:anim calcmode="lin" valueType="num">
+                                      <p:cBhvr additive="base">
+                                        <p:cTn id="8" dur="500" fill="hold"/>
+                                        <p:tgtEl>
+                                          <p:spTgt spid="3">
+                                            <p:txEl>
+                                              <p:pRg st="0" end="0"/>
+                                            </p:txEl>
+                                          </p:spTgt>
+                                        </p:tgtEl>
+                                        <p:attrNameLst>
+                                          <p:attrName>ppt_y</p:attrName>
+                                        </p:attrNameLst>
+                                      </p:cBhvr>
+                                      <p:tavLst>
+                                        <p:tav tm="0">
+                                          <p:val>
+                                            <p:strVal val="1+#ppt_h/2"/>
+                                          </p:val>
+                                        </p:tav>
+                                        <p:tav tm="100000">
+                                          <p:val>
+                                            <p:strVal val="#ppt_y"/>
+                                          </p:val>
+                                        </p:tav>
+                                      </p:tavLst>
+                                    </p:anim>
                                   </p:childTnLst>
                                 </p:cTn>
                               </p:par>
+                            </p:childTnLst>
+                          </p:cTn>
+                        </p:par>
+                      </p:childTnLst>
+                    </p:cTn>
+                  </p:par>
+                  <p:par>
+                    <p:cTn id="9" fill="hold">
+                      <p:stCondLst>
+                        <p:cond delay="indefinite"/>
+                      </p:stCondLst>
+                      <p:childTnLst>
+                        <p:par>
+                          <p:cTn id="10" fill="hold">
+                            <p:stCondLst>
+                              <p:cond delay="0"/>
+                            </p:stCondLst>
+                            <p:childTnLst>
                               <p:par>
-                                <p:cTn id="8" presetID="10" presetClass="entr" presetSubtype="0" fill="hold" grpId="0" nodeType="withEffect">
+                                <p:cTn id="11" presetID="10" presetClass="entr" presetSubtype="0" fill="hold" grpId="0" nodeType="clickEffect">
                                   <p:stCondLst>
-                                    <p:cond delay="1000"/>
+                                    <p:cond delay="0"/>
                                   </p:stCondLst>
-                                  <p:iterate>
-                                    <p:tmPct val="10000"/>
-                                  </p:iterate>
                                   <p:childTnLst>
                                     <p:set>
                                       <p:cBhvr>
-                                        <p:cTn id="9" dur="1" fill="hold">
+                                        <p:cTn id="12" dur="1" fill="hold">
                                           <p:stCondLst>
                                             <p:cond delay="0"/>
                                           </p:stCondLst>
@@ -5703,12 +5761,103 @@
                                     </p:set>
                                     <p:animEffect transition="in" filter="fade">
                                       <p:cBhvr>
-                                        <p:cTn id="10" dur="700"/>
+                                        <p:cTn id="13" dur="500"/>
                                         <p:tgtEl>
                                           <p:spTgt spid="2"/>
                                         </p:tgtEl>
                                       </p:cBhvr>
                                     </p:animEffect>
+                                  </p:childTnLst>
+                                </p:cTn>
+                              </p:par>
+                            </p:childTnLst>
+                          </p:cTn>
+                        </p:par>
+                      </p:childTnLst>
+                    </p:cTn>
+                  </p:par>
+                  <p:par>
+                    <p:cTn id="14" fill="hold">
+                      <p:stCondLst>
+                        <p:cond delay="indefinite"/>
+                      </p:stCondLst>
+                      <p:childTnLst>
+                        <p:par>
+                          <p:cTn id="15" fill="hold">
+                            <p:stCondLst>
+                              <p:cond delay="0"/>
+                            </p:stCondLst>
+                            <p:childTnLst>
+                              <p:par>
+                                <p:cTn id="16" presetID="2" presetClass="entr" presetSubtype="4" fill="hold" nodeType="clickEffect">
+                                  <p:stCondLst>
+                                    <p:cond delay="0"/>
+                                  </p:stCondLst>
+                                  <p:childTnLst>
+                                    <p:set>
+                                      <p:cBhvr>
+                                        <p:cTn id="17" dur="1" fill="hold">
+                                          <p:stCondLst>
+                                            <p:cond delay="0"/>
+                                          </p:stCondLst>
+                                        </p:cTn>
+                                        <p:tgtEl>
+                                          <p:spTgt spid="49"/>
+                                        </p:tgtEl>
+                                        <p:attrNameLst>
+                                          <p:attrName>style.visibility</p:attrName>
+                                        </p:attrNameLst>
+                                      </p:cBhvr>
+                                      <p:to>
+                                        <p:strVal val="visible"/>
+                                      </p:to>
+                                    </p:set>
+                                    <p:anim calcmode="lin" valueType="num">
+                                      <p:cBhvr additive="base">
+                                        <p:cTn id="18" dur="500" fill="hold"/>
+                                        <p:tgtEl>
+                                          <p:spTgt spid="49"/>
+                                        </p:tgtEl>
+                                        <p:attrNameLst>
+                                          <p:attrName>ppt_x</p:attrName>
+                                        </p:attrNameLst>
+                                      </p:cBhvr>
+                                      <p:tavLst>
+                                        <p:tav tm="0">
+                                          <p:val>
+                                            <p:strVal val="#ppt_x"/>
+                                          </p:val>
+                                        </p:tav>
+                                        <p:tav tm="100000">
+                                          <p:val>
+                                            <p:strVal val="#ppt_x"/>
+                                          </p:val>
+                                        </p:tav>
+                                      </p:tavLst>
+                                    </p:anim>
+                                    <p:anim calcmode="lin" valueType="num">
+                                      <p:cBhvr additive="base">
+                                        <p:cTn id="19" dur="500" fill="hold"/>
+                                        <p:tgtEl>
+                                          <p:spTgt spid="49"/>
+                                        </p:tgtEl>
+                                        <p:attrNameLst>
+                                          <p:attrName>ppt_y</p:attrName>
+                                        </p:attrNameLst>
+                                      </p:cBhvr>
+                                      <p:tavLst>
+                                        <p:tav tm="0">
+                                          <p:val>
+                                            <p:strVal val="1+#ppt_h/2"/>
+                                          </p:val>
+                                        </p:tav>
+                                        <p:tav tm="100000">
+                                          <p:val>
+                                            <p:strVal val="#ppt_y"/>
+                                          </p:val>
+                                        </p:tav>
+                                      </p:tavLst>
+                                    </p:anim>
                                   </p:childTnLst>
                                 </p:cTn>
                               </p:par>
@@ -5742,6 +5891,1396 @@
     <p:bldLst>
       <p:bldP spid="2" grpId="0"/>
       <p:bldP spid="3" grpId="0" build="p"/>
+    </p:bldLst>
+  </p:timing>
+</p:sld>
+</file>
+
+<file path=ppt/slides/slide2.xml><?xml version="1.0" encoding="utf-8"?>
+<p:sld xmlns:a="http://schemas.openxmlformats.org/drawingml/2006/main" xmlns:r="http://schemas.openxmlformats.org/officeDocument/2006/relationships" xmlns:p="http://schemas.openxmlformats.org/presentationml/2006/main">
+  <p:cSld>
+    <p:bg>
+      <p:bgPr>
+        <a:solidFill>
+          <a:schemeClr val="bg1"/>
+        </a:solidFill>
+        <a:effectLst/>
+      </p:bgPr>
+    </p:bg>
+    <p:spTree>
+      <p:nvGrpSpPr>
+        <p:cNvPr id="1" name=""/>
+        <p:cNvGrpSpPr/>
+        <p:nvPr/>
+      </p:nvGrpSpPr>
+      <p:grpSpPr>
+        <a:xfrm>
+          <a:off x="0" y="0"/>
+          <a:ext cx="0" cy="0"/>
+          <a:chOff x="0" y="0"/>
+          <a:chExt cx="0" cy="0"/>
+        </a:xfrm>
+      </p:grpSpPr>
+      <p:sp useBgFill="1">
+        <p:nvSpPr>
+          <p:cNvPr id="15" name="Rectangle 8">
+            <a:extLst>
+              <a:ext uri="{FF2B5EF4-FFF2-40B4-BE49-F238E27FC236}">
+                <a16:creationId xmlns:a16="http://schemas.microsoft.com/office/drawing/2014/main" id="{C868C70C-E5C4-CD47-888C-FCB3373B6D38}"/>
+              </a:ext>
+              <a:ext uri="{C183D7F6-B498-43B3-948B-1728B52AA6E4}">
+                <adec:decorative xmlns:adec="http://schemas.microsoft.com/office/drawing/2017/decorative" val="1"/>
+              </a:ext>
+            </a:extLst>
+          </p:cNvPr>
+          <p:cNvSpPr>
+            <a:spLocks noGrp="1" noRot="1" noChangeAspect="1" noMove="1" noResize="1" noEditPoints="1" noAdjustHandles="1" noChangeArrowheads="1" noChangeShapeType="1" noTextEdit="1"/>
+          </p:cNvSpPr>
+          <p:nvPr>
+            <p:extLst>
+              <p:ext uri="{386F3935-93C4-4BCD-93E2-E3B085C9AB24}">
+                <p16:designElem xmlns:p16="http://schemas.microsoft.com/office/powerpoint/2015/main" val="1"/>
+              </p:ext>
+            </p:extLst>
+          </p:nvPr>
+        </p:nvSpPr>
+        <p:spPr>
+          <a:xfrm>
+            <a:off x="0" y="0"/>
+            <a:ext cx="12188952" cy="6858000"/>
+          </a:xfrm>
+          <a:prstGeom prst="rect">
+            <a:avLst/>
+          </a:prstGeom>
+          <a:ln>
+            <a:noFill/>
+          </a:ln>
+        </p:spPr>
+        <p:style>
+          <a:lnRef idx="2">
+            <a:schemeClr val="accent1">
+              <a:shade val="50000"/>
+            </a:schemeClr>
+          </a:lnRef>
+          <a:fillRef idx="1">
+            <a:schemeClr val="accent1"/>
+          </a:fillRef>
+          <a:effectRef idx="0">
+            <a:schemeClr val="accent1"/>
+          </a:effectRef>
+          <a:fontRef idx="minor">
+            <a:schemeClr val="lt1"/>
+          </a:fontRef>
+        </p:style>
+        <p:txBody>
+          <a:bodyPr rtlCol="0" anchor="ctr"/>
+          <a:lstStyle/>
+          <a:p>
+            <a:pPr algn="ctr"/>
+            <a:endParaRPr lang="en-US"/>
+          </a:p>
+        </p:txBody>
+      </p:sp>
+      <p:sp>
+        <p:nvSpPr>
+          <p:cNvPr id="16" name="Rectangle 10">
+            <a:extLst>
+              <a:ext uri="{FF2B5EF4-FFF2-40B4-BE49-F238E27FC236}">
+                <a16:creationId xmlns:a16="http://schemas.microsoft.com/office/drawing/2014/main" id="{D8C68F39-5E8A-844C-A8FD-394F253C1E5F}"/>
+              </a:ext>
+              <a:ext uri="{C183D7F6-B498-43B3-948B-1728B52AA6E4}">
+                <adec:decorative xmlns:adec="http://schemas.microsoft.com/office/drawing/2017/decorative" val="1"/>
+              </a:ext>
+            </a:extLst>
+          </p:cNvPr>
+          <p:cNvSpPr>
+            <a:spLocks noGrp="1" noRot="1" noChangeAspect="1" noMove="1" noResize="1" noEditPoints="1" noAdjustHandles="1" noChangeArrowheads="1" noChangeShapeType="1" noTextEdit="1"/>
+          </p:cNvSpPr>
+          <p:nvPr>
+            <p:extLst>
+              <p:ext uri="{386F3935-93C4-4BCD-93E2-E3B085C9AB24}">
+                <p16:designElem xmlns:p16="http://schemas.microsoft.com/office/powerpoint/2015/main" val="1"/>
+              </p:ext>
+            </p:extLst>
+          </p:nvPr>
+        </p:nvSpPr>
+        <p:spPr>
+          <a:xfrm>
+            <a:off x="0" y="565153"/>
+            <a:ext cx="1133856" cy="6292847"/>
+          </a:xfrm>
+          <a:prstGeom prst="rect">
+            <a:avLst/>
+          </a:prstGeom>
+          <a:gradFill flip="none" rotWithShape="1">
+            <a:gsLst>
+              <a:gs pos="0">
+                <a:schemeClr val="accent1">
+                  <a:alpha val="50000"/>
+                </a:schemeClr>
+              </a:gs>
+              <a:gs pos="81000">
+                <a:schemeClr val="accent4">
+                  <a:alpha val="50000"/>
+                </a:schemeClr>
+              </a:gs>
+              <a:gs pos="25000">
+                <a:schemeClr val="accent2">
+                  <a:alpha val="60000"/>
+                </a:schemeClr>
+              </a:gs>
+              <a:gs pos="50000">
+                <a:schemeClr val="accent3">
+                  <a:alpha val="55000"/>
+                </a:schemeClr>
+              </a:gs>
+              <a:gs pos="99000">
+                <a:schemeClr val="accent5">
+                  <a:alpha val="50000"/>
+                </a:schemeClr>
+              </a:gs>
+            </a:gsLst>
+            <a:path path="circle">
+              <a:fillToRect r="100000" b="100000"/>
+            </a:path>
+            <a:tileRect l="-100000" t="-100000"/>
+          </a:gradFill>
+          <a:ln>
+            <a:noFill/>
+          </a:ln>
+        </p:spPr>
+        <p:style>
+          <a:lnRef idx="2">
+            <a:schemeClr val="accent1">
+              <a:shade val="50000"/>
+            </a:schemeClr>
+          </a:lnRef>
+          <a:fillRef idx="1">
+            <a:schemeClr val="accent1"/>
+          </a:fillRef>
+          <a:effectRef idx="0">
+            <a:schemeClr val="accent1"/>
+          </a:effectRef>
+          <a:fontRef idx="minor">
+            <a:schemeClr val="lt1"/>
+          </a:fontRef>
+        </p:style>
+        <p:txBody>
+          <a:bodyPr rtlCol="0" anchor="ctr"/>
+          <a:lstStyle/>
+          <a:p>
+            <a:pPr algn="ctr"/>
+            <a:endParaRPr lang="en-US"/>
+          </a:p>
+        </p:txBody>
+      </p:sp>
+      <p:sp>
+        <p:nvSpPr>
+          <p:cNvPr id="17" name="Rectangle 12">
+            <a:extLst>
+              <a:ext uri="{FF2B5EF4-FFF2-40B4-BE49-F238E27FC236}">
+                <a16:creationId xmlns:a16="http://schemas.microsoft.com/office/drawing/2014/main" id="{BC583CEB-AC2B-2640-94F6-5958E6BC5BAB}"/>
+              </a:ext>
+              <a:ext uri="{C183D7F6-B498-43B3-948B-1728B52AA6E4}">
+                <adec:decorative xmlns:adec="http://schemas.microsoft.com/office/drawing/2017/decorative" val="1"/>
+              </a:ext>
+            </a:extLst>
+          </p:cNvPr>
+          <p:cNvSpPr>
+            <a:spLocks noGrp="1" noRot="1" noChangeAspect="1" noMove="1" noResize="1" noEditPoints="1" noAdjustHandles="1" noChangeArrowheads="1" noChangeShapeType="1" noTextEdit="1"/>
+          </p:cNvSpPr>
+          <p:nvPr>
+            <p:extLst>
+              <p:ext uri="{386F3935-93C4-4BCD-93E2-E3B085C9AB24}">
+                <p16:designElem xmlns:p16="http://schemas.microsoft.com/office/powerpoint/2015/main" val="1"/>
+              </p:ext>
+            </p:extLst>
+          </p:nvPr>
+        </p:nvSpPr>
+        <p:spPr>
+          <a:xfrm>
+            <a:off x="0" y="-3"/>
+            <a:ext cx="565150" cy="6857999"/>
+          </a:xfrm>
+          <a:prstGeom prst="rect">
+            <a:avLst/>
+          </a:prstGeom>
+          <a:gradFill flip="none" rotWithShape="1">
+            <a:gsLst>
+              <a:gs pos="0">
+                <a:schemeClr val="accent1">
+                  <a:alpha val="50000"/>
+                </a:schemeClr>
+              </a:gs>
+              <a:gs pos="81000">
+                <a:schemeClr val="accent4">
+                  <a:alpha val="50000"/>
+                </a:schemeClr>
+              </a:gs>
+              <a:gs pos="25000">
+                <a:schemeClr val="accent2">
+                  <a:alpha val="60000"/>
+                </a:schemeClr>
+              </a:gs>
+              <a:gs pos="49000">
+                <a:schemeClr val="accent3">
+                  <a:alpha val="55000"/>
+                </a:schemeClr>
+              </a:gs>
+              <a:gs pos="99000">
+                <a:schemeClr val="accent5">
+                  <a:alpha val="50000"/>
+                </a:schemeClr>
+              </a:gs>
+            </a:gsLst>
+            <a:path path="circle">
+              <a:fillToRect r="100000" b="100000"/>
+            </a:path>
+            <a:tileRect l="-100000" t="-100000"/>
+          </a:gradFill>
+          <a:ln>
+            <a:noFill/>
+          </a:ln>
+        </p:spPr>
+        <p:style>
+          <a:lnRef idx="2">
+            <a:schemeClr val="accent1">
+              <a:shade val="50000"/>
+            </a:schemeClr>
+          </a:lnRef>
+          <a:fillRef idx="1">
+            <a:schemeClr val="accent1"/>
+          </a:fillRef>
+          <a:effectRef idx="0">
+            <a:schemeClr val="accent1"/>
+          </a:effectRef>
+          <a:fontRef idx="minor">
+            <a:schemeClr val="lt1"/>
+          </a:fontRef>
+        </p:style>
+        <p:txBody>
+          <a:bodyPr rtlCol="0" anchor="ctr"/>
+          <a:lstStyle/>
+          <a:p>
+            <a:pPr algn="ctr"/>
+            <a:endParaRPr lang="en-US"/>
+          </a:p>
+        </p:txBody>
+      </p:sp>
+      <p:sp>
+        <p:nvSpPr>
+          <p:cNvPr id="2" name="Title 1">
+            <a:extLst>
+              <a:ext uri="{FF2B5EF4-FFF2-40B4-BE49-F238E27FC236}">
+                <a16:creationId xmlns:a16="http://schemas.microsoft.com/office/drawing/2014/main" id="{886D770C-8139-457F-B6AF-62F5AF23278B}"/>
+              </a:ext>
+            </a:extLst>
+          </p:cNvPr>
+          <p:cNvSpPr>
+            <a:spLocks noGrp="1"/>
+          </p:cNvSpPr>
+          <p:nvPr>
+            <p:ph type="title"/>
+          </p:nvPr>
+        </p:nvSpPr>
+        <p:spPr>
+          <a:xfrm>
+            <a:off x="7695729" y="455362"/>
+            <a:ext cx="3378671" cy="1550419"/>
+          </a:xfrm>
+        </p:spPr>
+        <p:txBody>
+          <a:bodyPr>
+            <a:normAutofit/>
+          </a:bodyPr>
+          <a:lstStyle/>
+          <a:p>
+            <a:r>
+              <a:rPr lang="en-US" dirty="0"/>
+              <a:t>Animation</a:t>
+            </a:r>
+          </a:p>
+        </p:txBody>
+      </p:sp>
+      <p:sp>
+        <p:nvSpPr>
+          <p:cNvPr id="3" name="Content Placeholder 2">
+            <a:extLst>
+              <a:ext uri="{FF2B5EF4-FFF2-40B4-BE49-F238E27FC236}">
+                <a16:creationId xmlns:a16="http://schemas.microsoft.com/office/drawing/2014/main" id="{9BF3D8D4-65AC-4CA8-AE72-1C7FEA36581E}"/>
+              </a:ext>
+            </a:extLst>
+          </p:cNvPr>
+          <p:cNvSpPr>
+            <a:spLocks noGrp="1"/>
+          </p:cNvSpPr>
+          <p:nvPr>
+            <p:ph idx="1"/>
+          </p:nvPr>
+        </p:nvSpPr>
+        <p:spPr>
+          <a:xfrm>
+            <a:off x="7695728" y="2160016"/>
+            <a:ext cx="3378672" cy="3926152"/>
+          </a:xfrm>
+        </p:spPr>
+        <p:txBody>
+          <a:bodyPr>
+            <a:normAutofit/>
+          </a:bodyPr>
+          <a:lstStyle/>
+          <a:p>
+            <a:r>
+              <a:rPr lang="en-US" dirty="0"/>
+              <a:t>I added animations to the game to make it appear more life like!</a:t>
+            </a:r>
+          </a:p>
+        </p:txBody>
+      </p:sp>
+      <p:pic>
+        <p:nvPicPr>
+          <p:cNvPr id="4" name="Connect4Animations">
+            <a:hlinkClick r:id="" action="ppaction://media"/>
+            <a:extLst>
+              <a:ext uri="{FF2B5EF4-FFF2-40B4-BE49-F238E27FC236}">
+                <a16:creationId xmlns:a16="http://schemas.microsoft.com/office/drawing/2014/main" id="{0DA72A8E-D8B8-44A6-B0D0-36C6A79434DC}"/>
+              </a:ext>
+            </a:extLst>
+          </p:cNvPr>
+          <p:cNvPicPr>
+            <a:picLocks noChangeAspect="1"/>
+          </p:cNvPicPr>
+          <p:nvPr>
+            <a:videoFile r:link="rId2"/>
+            <p:extLst>
+              <p:ext uri="{DAA4B4D4-6D71-4841-9C94-3DE7FCFB9230}">
+                <p14:media xmlns:p14="http://schemas.microsoft.com/office/powerpoint/2010/main" r:embed="rId1"/>
+              </p:ext>
+            </p:extLst>
+          </p:nvPr>
+        </p:nvPicPr>
+        <p:blipFill>
+          <a:blip r:embed="rId4"/>
+          <a:stretch>
+            <a:fillRect/>
+          </a:stretch>
+        </p:blipFill>
+        <p:spPr>
+          <a:xfrm>
+            <a:off x="1789212" y="565154"/>
+            <a:ext cx="5389479" cy="5527672"/>
+          </a:xfrm>
+          <a:prstGeom prst="rect">
+            <a:avLst/>
+          </a:prstGeom>
+        </p:spPr>
+      </p:pic>
+    </p:spTree>
+    <p:extLst>
+      <p:ext uri="{BB962C8B-B14F-4D97-AF65-F5344CB8AC3E}">
+        <p14:creationId xmlns:p14="http://schemas.microsoft.com/office/powerpoint/2010/main" val="2397115559"/>
+      </p:ext>
+    </p:extLst>
+  </p:cSld>
+  <p:clrMapOvr>
+    <a:masterClrMapping/>
+  </p:clrMapOvr>
+  <p:timing>
+    <p:tnLst>
+      <p:par>
+        <p:cTn id="1" dur="indefinite" restart="never" nodeType="tmRoot">
+          <p:childTnLst>
+            <p:seq concurrent="1" nextAc="seek">
+              <p:cTn id="2" dur="indefinite" nodeType="mainSeq">
+                <p:childTnLst>
+                  <p:par>
+                    <p:cTn id="3" fill="hold">
+                      <p:stCondLst>
+                        <p:cond delay="indefinite"/>
+                      </p:stCondLst>
+                      <p:childTnLst>
+                        <p:par>
+                          <p:cTn id="4" fill="hold">
+                            <p:stCondLst>
+                              <p:cond delay="0"/>
+                            </p:stCondLst>
+                            <p:childTnLst>
+                              <p:par>
+                                <p:cTn id="5" presetID="1" presetClass="mediacall" presetSubtype="0" fill="hold" nodeType="clickEffect">
+                                  <p:stCondLst>
+                                    <p:cond delay="0"/>
+                                  </p:stCondLst>
+                                  <p:childTnLst>
+                                    <p:cmd type="call" cmd="playFrom(0.0)">
+                                      <p:cBhvr>
+                                        <p:cTn id="6" dur="7176" fill="hold"/>
+                                        <p:tgtEl>
+                                          <p:spTgt spid="4"/>
+                                        </p:tgtEl>
+                                      </p:cBhvr>
+                                    </p:cmd>
+                                  </p:childTnLst>
+                                </p:cTn>
+                              </p:par>
+                            </p:childTnLst>
+                          </p:cTn>
+                        </p:par>
+                      </p:childTnLst>
+                    </p:cTn>
+                  </p:par>
+                  <p:par>
+                    <p:cTn id="7" fill="hold">
+                      <p:stCondLst>
+                        <p:cond delay="indefinite"/>
+                      </p:stCondLst>
+                      <p:childTnLst>
+                        <p:par>
+                          <p:cTn id="8" fill="hold">
+                            <p:stCondLst>
+                              <p:cond delay="0"/>
+                            </p:stCondLst>
+                            <p:childTnLst>
+                              <p:par>
+                                <p:cTn id="9" presetID="2" presetClass="entr" presetSubtype="4" fill="hold" grpId="0" nodeType="clickEffect">
+                                  <p:stCondLst>
+                                    <p:cond delay="0"/>
+                                  </p:stCondLst>
+                                  <p:childTnLst>
+                                    <p:set>
+                                      <p:cBhvr>
+                                        <p:cTn id="10" dur="1" fill="hold">
+                                          <p:stCondLst>
+                                            <p:cond delay="0"/>
+                                          </p:stCondLst>
+                                        </p:cTn>
+                                        <p:tgtEl>
+                                          <p:spTgt spid="2"/>
+                                        </p:tgtEl>
+                                        <p:attrNameLst>
+                                          <p:attrName>style.visibility</p:attrName>
+                                        </p:attrNameLst>
+                                      </p:cBhvr>
+                                      <p:to>
+                                        <p:strVal val="visible"/>
+                                      </p:to>
+                                    </p:set>
+                                    <p:anim calcmode="lin" valueType="num">
+                                      <p:cBhvr additive="base">
+                                        <p:cTn id="11" dur="500" fill="hold"/>
+                                        <p:tgtEl>
+                                          <p:spTgt spid="2"/>
+                                        </p:tgtEl>
+                                        <p:attrNameLst>
+                                          <p:attrName>ppt_x</p:attrName>
+                                        </p:attrNameLst>
+                                      </p:cBhvr>
+                                      <p:tavLst>
+                                        <p:tav tm="0">
+                                          <p:val>
+                                            <p:strVal val="#ppt_x"/>
+                                          </p:val>
+                                        </p:tav>
+                                        <p:tav tm="100000">
+                                          <p:val>
+                                            <p:strVal val="#ppt_x"/>
+                                          </p:val>
+                                        </p:tav>
+                                      </p:tavLst>
+                                    </p:anim>
+                                    <p:anim calcmode="lin" valueType="num">
+                                      <p:cBhvr additive="base">
+                                        <p:cTn id="12" dur="500" fill="hold"/>
+                                        <p:tgtEl>
+                                          <p:spTgt spid="2"/>
+                                        </p:tgtEl>
+                                        <p:attrNameLst>
+                                          <p:attrName>ppt_y</p:attrName>
+                                        </p:attrNameLst>
+                                      </p:cBhvr>
+                                      <p:tavLst>
+                                        <p:tav tm="0">
+                                          <p:val>
+                                            <p:strVal val="1+#ppt_h/2"/>
+                                          </p:val>
+                                        </p:tav>
+                                        <p:tav tm="100000">
+                                          <p:val>
+                                            <p:strVal val="#ppt_y"/>
+                                          </p:val>
+                                        </p:tav>
+                                      </p:tavLst>
+                                    </p:anim>
+                                  </p:childTnLst>
+                                </p:cTn>
+                              </p:par>
+                            </p:childTnLst>
+                          </p:cTn>
+                        </p:par>
+                      </p:childTnLst>
+                    </p:cTn>
+                  </p:par>
+                  <p:par>
+                    <p:cTn id="13" fill="hold">
+                      <p:stCondLst>
+                        <p:cond delay="indefinite"/>
+                      </p:stCondLst>
+                      <p:childTnLst>
+                        <p:par>
+                          <p:cTn id="14" fill="hold">
+                            <p:stCondLst>
+                              <p:cond delay="0"/>
+                            </p:stCondLst>
+                            <p:childTnLst>
+                              <p:par>
+                                <p:cTn id="15" presetID="2" presetClass="entr" presetSubtype="4" fill="hold" nodeType="clickEffect">
+                                  <p:stCondLst>
+                                    <p:cond delay="0"/>
+                                  </p:stCondLst>
+                                  <p:childTnLst>
+                                    <p:set>
+                                      <p:cBhvr>
+                                        <p:cTn id="16" dur="1" fill="hold">
+                                          <p:stCondLst>
+                                            <p:cond delay="0"/>
+                                          </p:stCondLst>
+                                        </p:cTn>
+                                        <p:tgtEl>
+                                          <p:spTgt spid="3">
+                                            <p:txEl>
+                                              <p:pRg st="0" end="0"/>
+                                            </p:txEl>
+                                          </p:spTgt>
+                                        </p:tgtEl>
+                                        <p:attrNameLst>
+                                          <p:attrName>style.visibility</p:attrName>
+                                        </p:attrNameLst>
+                                      </p:cBhvr>
+                                      <p:to>
+                                        <p:strVal val="visible"/>
+                                      </p:to>
+                                    </p:set>
+                                    <p:anim calcmode="lin" valueType="num">
+                                      <p:cBhvr additive="base">
+                                        <p:cTn id="17" dur="500" fill="hold"/>
+                                        <p:tgtEl>
+                                          <p:spTgt spid="3">
+                                            <p:txEl>
+                                              <p:pRg st="0" end="0"/>
+                                            </p:txEl>
+                                          </p:spTgt>
+                                        </p:tgtEl>
+                                        <p:attrNameLst>
+                                          <p:attrName>ppt_x</p:attrName>
+                                        </p:attrNameLst>
+                                      </p:cBhvr>
+                                      <p:tavLst>
+                                        <p:tav tm="0">
+                                          <p:val>
+                                            <p:strVal val="#ppt_x"/>
+                                          </p:val>
+                                        </p:tav>
+                                        <p:tav tm="100000">
+                                          <p:val>
+                                            <p:strVal val="#ppt_x"/>
+                                          </p:val>
+                                        </p:tav>
+                                      </p:tavLst>
+                                    </p:anim>
+                                    <p:anim calcmode="lin" valueType="num">
+                                      <p:cBhvr additive="base">
+                                        <p:cTn id="18" dur="500" fill="hold"/>
+                                        <p:tgtEl>
+                                          <p:spTgt spid="3">
+                                            <p:txEl>
+                                              <p:pRg st="0" end="0"/>
+                                            </p:txEl>
+                                          </p:spTgt>
+                                        </p:tgtEl>
+                                        <p:attrNameLst>
+                                          <p:attrName>ppt_y</p:attrName>
+                                        </p:attrNameLst>
+                                      </p:cBhvr>
+                                      <p:tavLst>
+                                        <p:tav tm="0">
+                                          <p:val>
+                                            <p:strVal val="1+#ppt_h/2"/>
+                                          </p:val>
+                                        </p:tav>
+                                        <p:tav tm="100000">
+                                          <p:val>
+                                            <p:strVal val="#ppt_y"/>
+                                          </p:val>
+                                        </p:tav>
+                                      </p:tavLst>
+                                    </p:anim>
+                                  </p:childTnLst>
+                                </p:cTn>
+                              </p:par>
+                            </p:childTnLst>
+                          </p:cTn>
+                        </p:par>
+                      </p:childTnLst>
+                    </p:cTn>
+                  </p:par>
+                </p:childTnLst>
+              </p:cTn>
+              <p:prevCondLst>
+                <p:cond evt="onPrev" delay="0">
+                  <p:tgtEl>
+                    <p:sldTgt/>
+                  </p:tgtEl>
+                </p:cond>
+              </p:prevCondLst>
+              <p:nextCondLst>
+                <p:cond evt="onNext" delay="0">
+                  <p:tgtEl>
+                    <p:sldTgt/>
+                  </p:tgtEl>
+                </p:cond>
+              </p:nextCondLst>
+            </p:seq>
+            <p:video>
+              <p:cMediaNode vol="80000">
+                <p:cTn id="19" fill="hold" display="0">
+                  <p:stCondLst>
+                    <p:cond delay="indefinite"/>
+                  </p:stCondLst>
+                </p:cTn>
+                <p:tgtEl>
+                  <p:spTgt spid="4"/>
+                </p:tgtEl>
+              </p:cMediaNode>
+            </p:video>
+            <p:seq concurrent="1" nextAc="seek">
+              <p:cTn id="20" restart="whenNotActive" fill="hold" evtFilter="cancelBubble" nodeType="interactiveSeq">
+                <p:stCondLst>
+                  <p:cond evt="onClick" delay="0">
+                    <p:tgtEl>
+                      <p:spTgt spid="4"/>
+                    </p:tgtEl>
+                  </p:cond>
+                </p:stCondLst>
+                <p:endSync evt="end" delay="0">
+                  <p:rtn val="all"/>
+                </p:endSync>
+                <p:childTnLst>
+                  <p:par>
+                    <p:cTn id="21" fill="hold">
+                      <p:stCondLst>
+                        <p:cond delay="0"/>
+                      </p:stCondLst>
+                      <p:childTnLst>
+                        <p:par>
+                          <p:cTn id="22" fill="hold">
+                            <p:stCondLst>
+                              <p:cond delay="0"/>
+                            </p:stCondLst>
+                            <p:childTnLst>
+                              <p:par>
+                                <p:cTn id="23" presetID="1" presetClass="mediacall" presetSubtype="0" fill="hold" nodeType="clickEffect">
+                                  <p:stCondLst>
+                                    <p:cond delay="0"/>
+                                  </p:stCondLst>
+                                  <p:childTnLst>
+                                    <p:cmd type="call" cmd="playFrom(0.0)">
+                                      <p:cBhvr>
+                                        <p:cTn id="24" dur="7176" fill="hold"/>
+                                        <p:tgtEl>
+                                          <p:spTgt spid="4"/>
+                                        </p:tgtEl>
+                                      </p:cBhvr>
+                                    </p:cmd>
+                                  </p:childTnLst>
+                                </p:cTn>
+                              </p:par>
+                            </p:childTnLst>
+                          </p:cTn>
+                        </p:par>
+                      </p:childTnLst>
+                    </p:cTn>
+                  </p:par>
+                </p:childTnLst>
+              </p:cTn>
+              <p:nextCondLst>
+                <p:cond evt="onClick" delay="0">
+                  <p:tgtEl>
+                    <p:spTgt spid="4"/>
+                  </p:tgtEl>
+                </p:cond>
+              </p:nextCondLst>
+            </p:seq>
+          </p:childTnLst>
+        </p:cTn>
+      </p:par>
+    </p:tnLst>
+    <p:bldLst>
+      <p:bldP spid="2" grpId="0"/>
+    </p:bldLst>
+  </p:timing>
+</p:sld>
+</file>
+
+<file path=ppt/slides/slide3.xml><?xml version="1.0" encoding="utf-8"?>
+<p:sld xmlns:a="http://schemas.openxmlformats.org/drawingml/2006/main" xmlns:r="http://schemas.openxmlformats.org/officeDocument/2006/relationships" xmlns:p="http://schemas.openxmlformats.org/presentationml/2006/main">
+  <p:cSld>
+    <p:bg>
+      <p:bgPr>
+        <a:solidFill>
+          <a:schemeClr val="bg1"/>
+        </a:solidFill>
+        <a:effectLst/>
+      </p:bgPr>
+    </p:bg>
+    <p:spTree>
+      <p:nvGrpSpPr>
+        <p:cNvPr id="1" name=""/>
+        <p:cNvGrpSpPr/>
+        <p:nvPr/>
+      </p:nvGrpSpPr>
+      <p:grpSpPr>
+        <a:xfrm>
+          <a:off x="0" y="0"/>
+          <a:ext cx="0" cy="0"/>
+          <a:chOff x="0" y="0"/>
+          <a:chExt cx="0" cy="0"/>
+        </a:xfrm>
+      </p:grpSpPr>
+      <p:sp>
+        <p:nvSpPr>
+          <p:cNvPr id="21" name="Rectangle 8">
+            <a:extLst>
+              <a:ext uri="{FF2B5EF4-FFF2-40B4-BE49-F238E27FC236}">
+                <a16:creationId xmlns:a16="http://schemas.microsoft.com/office/drawing/2014/main" id="{2D03A0B2-4A2F-D846-A5E6-FB7CB9A031F7}"/>
+              </a:ext>
+              <a:ext uri="{C183D7F6-B498-43B3-948B-1728B52AA6E4}">
+                <adec:decorative xmlns:adec="http://schemas.microsoft.com/office/drawing/2017/decorative" val="1"/>
+              </a:ext>
+            </a:extLst>
+          </p:cNvPr>
+          <p:cNvSpPr>
+            <a:spLocks noGrp="1" noRot="1" noChangeAspect="1" noMove="1" noResize="1" noEditPoints="1" noAdjustHandles="1" noChangeArrowheads="1" noChangeShapeType="1" noTextEdit="1"/>
+          </p:cNvSpPr>
+          <p:nvPr>
+            <p:extLst>
+              <p:ext uri="{386F3935-93C4-4BCD-93E2-E3B085C9AB24}">
+                <p16:designElem xmlns:p16="http://schemas.microsoft.com/office/powerpoint/2015/main" val="1"/>
+              </p:ext>
+            </p:extLst>
+          </p:nvPr>
+        </p:nvSpPr>
+        <p:spPr>
+          <a:xfrm>
+            <a:off x="1" y="1375492"/>
+            <a:ext cx="2770698" cy="5482505"/>
+          </a:xfrm>
+          <a:prstGeom prst="rect">
+            <a:avLst/>
+          </a:prstGeom>
+          <a:gradFill flip="none" rotWithShape="1">
+            <a:gsLst>
+              <a:gs pos="0">
+                <a:schemeClr val="accent1">
+                  <a:alpha val="50000"/>
+                </a:schemeClr>
+              </a:gs>
+              <a:gs pos="81000">
+                <a:schemeClr val="accent4">
+                  <a:alpha val="50000"/>
+                </a:schemeClr>
+              </a:gs>
+              <a:gs pos="25000">
+                <a:schemeClr val="accent2">
+                  <a:alpha val="60000"/>
+                </a:schemeClr>
+              </a:gs>
+              <a:gs pos="50000">
+                <a:schemeClr val="accent3">
+                  <a:alpha val="55000"/>
+                </a:schemeClr>
+              </a:gs>
+              <a:gs pos="99000">
+                <a:schemeClr val="accent5">
+                  <a:alpha val="50000"/>
+                </a:schemeClr>
+              </a:gs>
+            </a:gsLst>
+            <a:path path="circle">
+              <a:fillToRect r="100000" b="100000"/>
+            </a:path>
+            <a:tileRect l="-100000" t="-100000"/>
+          </a:gradFill>
+          <a:ln>
+            <a:noFill/>
+          </a:ln>
+        </p:spPr>
+        <p:style>
+          <a:lnRef idx="2">
+            <a:schemeClr val="accent1">
+              <a:shade val="50000"/>
+            </a:schemeClr>
+          </a:lnRef>
+          <a:fillRef idx="1">
+            <a:schemeClr val="accent1"/>
+          </a:fillRef>
+          <a:effectRef idx="0">
+            <a:schemeClr val="accent1"/>
+          </a:effectRef>
+          <a:fontRef idx="minor">
+            <a:schemeClr val="lt1"/>
+          </a:fontRef>
+        </p:style>
+        <p:txBody>
+          <a:bodyPr rtlCol="0" anchor="ctr"/>
+          <a:lstStyle/>
+          <a:p>
+            <a:pPr lvl="0" algn="ctr"/>
+            <a:endParaRPr lang="en-US"/>
+          </a:p>
+        </p:txBody>
+      </p:sp>
+      <p:sp>
+        <p:nvSpPr>
+          <p:cNvPr id="22" name="Rectangle 10">
+            <a:extLst>
+              <a:ext uri="{FF2B5EF4-FFF2-40B4-BE49-F238E27FC236}">
+                <a16:creationId xmlns:a16="http://schemas.microsoft.com/office/drawing/2014/main" id="{7F573F1D-73A7-FB41-BCAD-FC9AA7DEF4F5}"/>
+              </a:ext>
+              <a:ext uri="{C183D7F6-B498-43B3-948B-1728B52AA6E4}">
+                <adec:decorative xmlns:adec="http://schemas.microsoft.com/office/drawing/2017/decorative" val="1"/>
+              </a:ext>
+            </a:extLst>
+          </p:cNvPr>
+          <p:cNvSpPr>
+            <a:spLocks noGrp="1" noRot="1" noChangeAspect="1" noMove="1" noResize="1" noEditPoints="1" noAdjustHandles="1" noChangeArrowheads="1" noChangeShapeType="1" noTextEdit="1"/>
+          </p:cNvSpPr>
+          <p:nvPr>
+            <p:extLst>
+              <p:ext uri="{386F3935-93C4-4BCD-93E2-E3B085C9AB24}">
+                <p16:designElem xmlns:p16="http://schemas.microsoft.com/office/powerpoint/2015/main" val="1"/>
+              </p:ext>
+            </p:extLst>
+          </p:nvPr>
+        </p:nvSpPr>
+        <p:spPr>
+          <a:xfrm>
+            <a:off x="0" y="-3"/>
+            <a:ext cx="1373567" cy="6857999"/>
+          </a:xfrm>
+          <a:prstGeom prst="rect">
+            <a:avLst/>
+          </a:prstGeom>
+          <a:gradFill flip="none" rotWithShape="1">
+            <a:gsLst>
+              <a:gs pos="0">
+                <a:schemeClr val="accent1">
+                  <a:alpha val="50000"/>
+                </a:schemeClr>
+              </a:gs>
+              <a:gs pos="81000">
+                <a:schemeClr val="accent4">
+                  <a:alpha val="50000"/>
+                </a:schemeClr>
+              </a:gs>
+              <a:gs pos="25000">
+                <a:schemeClr val="accent2">
+                  <a:alpha val="60000"/>
+                </a:schemeClr>
+              </a:gs>
+              <a:gs pos="50000">
+                <a:schemeClr val="accent3">
+                  <a:alpha val="55000"/>
+                </a:schemeClr>
+              </a:gs>
+              <a:gs pos="99000">
+                <a:schemeClr val="accent5">
+                  <a:alpha val="50000"/>
+                </a:schemeClr>
+              </a:gs>
+            </a:gsLst>
+            <a:path path="circle">
+              <a:fillToRect r="100000" b="100000"/>
+            </a:path>
+            <a:tileRect l="-100000" t="-100000"/>
+          </a:gradFill>
+          <a:ln>
+            <a:noFill/>
+          </a:ln>
+        </p:spPr>
+        <p:style>
+          <a:lnRef idx="2">
+            <a:schemeClr val="accent1">
+              <a:shade val="50000"/>
+            </a:schemeClr>
+          </a:lnRef>
+          <a:fillRef idx="1">
+            <a:schemeClr val="accent1"/>
+          </a:fillRef>
+          <a:effectRef idx="0">
+            <a:schemeClr val="accent1"/>
+          </a:effectRef>
+          <a:fontRef idx="minor">
+            <a:schemeClr val="lt1"/>
+          </a:fontRef>
+        </p:style>
+        <p:txBody>
+          <a:bodyPr rtlCol="0" anchor="ctr"/>
+          <a:lstStyle/>
+          <a:p>
+            <a:pPr lvl="0" algn="ctr"/>
+            <a:endParaRPr lang="en-US"/>
+          </a:p>
+        </p:txBody>
+      </p:sp>
+      <p:sp useBgFill="1">
+        <p:nvSpPr>
+          <p:cNvPr id="23" name="Rectangle 12">
+            <a:extLst>
+              <a:ext uri="{FF2B5EF4-FFF2-40B4-BE49-F238E27FC236}">
+                <a16:creationId xmlns:a16="http://schemas.microsoft.com/office/drawing/2014/main" id="{A88F843D-1C1B-C740-AC27-E3238D0F5F47}"/>
+              </a:ext>
+              <a:ext uri="{C183D7F6-B498-43B3-948B-1728B52AA6E4}">
+                <adec:decorative xmlns:adec="http://schemas.microsoft.com/office/drawing/2017/decorative" val="1"/>
+              </a:ext>
+            </a:extLst>
+          </p:cNvPr>
+          <p:cNvSpPr>
+            <a:spLocks noGrp="1" noRot="1" noChangeAspect="1" noMove="1" noResize="1" noEditPoints="1" noAdjustHandles="1" noChangeArrowheads="1" noChangeShapeType="1" noTextEdit="1"/>
+          </p:cNvSpPr>
+          <p:nvPr>
+            <p:extLst>
+              <p:ext uri="{386F3935-93C4-4BCD-93E2-E3B085C9AB24}">
+                <p16:designElem xmlns:p16="http://schemas.microsoft.com/office/powerpoint/2015/main" val="1"/>
+              </p:ext>
+            </p:extLst>
+          </p:nvPr>
+        </p:nvSpPr>
+        <p:spPr>
+          <a:xfrm>
+            <a:off x="0" y="0"/>
+            <a:ext cx="12188952" cy="6858000"/>
+          </a:xfrm>
+          <a:prstGeom prst="rect">
+            <a:avLst/>
+          </a:prstGeom>
+          <a:ln>
+            <a:noFill/>
+          </a:ln>
+        </p:spPr>
+        <p:style>
+          <a:lnRef idx="2">
+            <a:schemeClr val="accent1">
+              <a:shade val="50000"/>
+            </a:schemeClr>
+          </a:lnRef>
+          <a:fillRef idx="1">
+            <a:schemeClr val="accent1"/>
+          </a:fillRef>
+          <a:effectRef idx="0">
+            <a:schemeClr val="accent1"/>
+          </a:effectRef>
+          <a:fontRef idx="minor">
+            <a:schemeClr val="lt1"/>
+          </a:fontRef>
+        </p:style>
+        <p:txBody>
+          <a:bodyPr rtlCol="0" anchor="ctr"/>
+          <a:lstStyle/>
+          <a:p>
+            <a:pPr algn="ctr"/>
+            <a:endParaRPr lang="en-US"/>
+          </a:p>
+        </p:txBody>
+      </p:sp>
+      <p:pic>
+        <p:nvPicPr>
+          <p:cNvPr id="24" name="Picture 4" descr="White arrows painted on the asphalt">
+            <a:extLst>
+              <a:ext uri="{FF2B5EF4-FFF2-40B4-BE49-F238E27FC236}">
+                <a16:creationId xmlns:a16="http://schemas.microsoft.com/office/drawing/2014/main" id="{16EDA352-374A-D750-D1DD-96258CFC7ECB}"/>
+              </a:ext>
+            </a:extLst>
+          </p:cNvPr>
+          <p:cNvPicPr>
+            <a:picLocks noChangeAspect="1"/>
+          </p:cNvPicPr>
+          <p:nvPr/>
+        </p:nvPicPr>
+        <p:blipFill rotWithShape="1">
+          <a:blip r:embed="rId2"/>
+          <a:srcRect t="1113" b="13982"/>
+          <a:stretch/>
+        </p:blipFill>
+        <p:spPr>
+          <a:xfrm>
+            <a:off x="20" y="10"/>
+            <a:ext cx="12191980" cy="6857990"/>
+          </a:xfrm>
+          <a:prstGeom prst="rect">
+            <a:avLst/>
+          </a:prstGeom>
+        </p:spPr>
+      </p:pic>
+      <p:sp>
+        <p:nvSpPr>
+          <p:cNvPr id="25" name="Rectangle">
+            <a:extLst>
+              <a:ext uri="{FF2B5EF4-FFF2-40B4-BE49-F238E27FC236}">
+                <a16:creationId xmlns:a16="http://schemas.microsoft.com/office/drawing/2014/main" id="{44037D61-FFBD-0342-90C5-D1AD7C899B44}"/>
+              </a:ext>
+              <a:ext uri="{C183D7F6-B498-43B3-948B-1728B52AA6E4}">
+                <adec:decorative xmlns:adec="http://schemas.microsoft.com/office/drawing/2017/decorative" val="1"/>
+              </a:ext>
+            </a:extLst>
+          </p:cNvPr>
+          <p:cNvSpPr>
+            <a:spLocks noGrp="1" noRot="1" noChangeAspect="1" noMove="1" noResize="1" noEditPoints="1" noAdjustHandles="1" noChangeArrowheads="1" noChangeShapeType="1" noTextEdit="1"/>
+          </p:cNvSpPr>
+          <p:nvPr>
+            <p:extLst>
+              <p:ext uri="{386F3935-93C4-4BCD-93E2-E3B085C9AB24}">
+                <p16:designElem xmlns:p16="http://schemas.microsoft.com/office/powerpoint/2015/main" val="1"/>
+              </p:ext>
+            </p:extLst>
+          </p:nvPr>
+        </p:nvSpPr>
+        <p:spPr>
+          <a:xfrm>
+            <a:off x="3051" y="565152"/>
+            <a:ext cx="12188949" cy="2190751"/>
+          </a:xfrm>
+          <a:prstGeom prst="rect">
+            <a:avLst/>
+          </a:prstGeom>
+          <a:solidFill>
+            <a:schemeClr val="bg1">
+              <a:alpha val="85000"/>
+            </a:schemeClr>
+          </a:solidFill>
+          <a:ln w="12700">
+            <a:miter lim="400000"/>
+          </a:ln>
+        </p:spPr>
+        <p:txBody>
+          <a:bodyPr lIns="50800" tIns="50800" rIns="50800" bIns="50800" anchor="ctr"/>
+          <a:lstStyle/>
+          <a:p>
+            <a:pPr algn="ctr" defTabSz="457200"/>
+            <a:endParaRPr sz="2600" cap="all" dirty="0">
+              <a:solidFill>
+                <a:srgbClr val="FFFFFF"/>
+              </a:solidFill>
+              <a:sym typeface="Avenir Next"/>
+            </a:endParaRPr>
+          </a:p>
+        </p:txBody>
+      </p:sp>
+      <p:sp>
+        <p:nvSpPr>
+          <p:cNvPr id="26" name="Rectangle 16">
+            <a:extLst>
+              <a:ext uri="{FF2B5EF4-FFF2-40B4-BE49-F238E27FC236}">
+                <a16:creationId xmlns:a16="http://schemas.microsoft.com/office/drawing/2014/main" id="{D5B0F748-7FA7-4DDF-89A3-7F1D8EE1F7C0}"/>
+              </a:ext>
+              <a:ext uri="{C183D7F6-B498-43B3-948B-1728B52AA6E4}">
+                <adec:decorative xmlns:adec="http://schemas.microsoft.com/office/drawing/2017/decorative" val="1"/>
+              </a:ext>
+            </a:extLst>
+          </p:cNvPr>
+          <p:cNvSpPr>
+            <a:spLocks noGrp="1" noRot="1" noChangeAspect="1" noMove="1" noResize="1" noEditPoints="1" noAdjustHandles="1" noChangeArrowheads="1" noChangeShapeType="1" noTextEdit="1"/>
+          </p:cNvSpPr>
+          <p:nvPr>
+            <p:extLst>
+              <p:ext uri="{386F3935-93C4-4BCD-93E2-E3B085C9AB24}">
+                <p16:designElem xmlns:p16="http://schemas.microsoft.com/office/powerpoint/2015/main" val="1"/>
+              </p:ext>
+            </p:extLst>
+          </p:nvPr>
+        </p:nvSpPr>
+        <p:spPr>
+          <a:xfrm>
+            <a:off x="11058144" y="565153"/>
+            <a:ext cx="1133856" cy="6292847"/>
+          </a:xfrm>
+          <a:prstGeom prst="rect">
+            <a:avLst/>
+          </a:prstGeom>
+          <a:gradFill flip="none" rotWithShape="1">
+            <a:gsLst>
+              <a:gs pos="0">
+                <a:schemeClr val="accent1">
+                  <a:alpha val="50000"/>
+                </a:schemeClr>
+              </a:gs>
+              <a:gs pos="81000">
+                <a:schemeClr val="accent4">
+                  <a:alpha val="50000"/>
+                </a:schemeClr>
+              </a:gs>
+              <a:gs pos="25000">
+                <a:schemeClr val="accent2">
+                  <a:alpha val="60000"/>
+                </a:schemeClr>
+              </a:gs>
+              <a:gs pos="50000">
+                <a:schemeClr val="accent3">
+                  <a:alpha val="55000"/>
+                </a:schemeClr>
+              </a:gs>
+              <a:gs pos="99000">
+                <a:schemeClr val="accent5">
+                  <a:alpha val="50000"/>
+                </a:schemeClr>
+              </a:gs>
+            </a:gsLst>
+            <a:path path="circle">
+              <a:fillToRect r="100000" b="100000"/>
+            </a:path>
+            <a:tileRect l="-100000" t="-100000"/>
+          </a:gradFill>
+          <a:ln>
+            <a:noFill/>
+          </a:ln>
+        </p:spPr>
+        <p:style>
+          <a:lnRef idx="2">
+            <a:schemeClr val="accent1">
+              <a:shade val="50000"/>
+            </a:schemeClr>
+          </a:lnRef>
+          <a:fillRef idx="1">
+            <a:schemeClr val="accent1"/>
+          </a:fillRef>
+          <a:effectRef idx="0">
+            <a:schemeClr val="accent1"/>
+          </a:effectRef>
+          <a:fontRef idx="minor">
+            <a:schemeClr val="lt1"/>
+          </a:fontRef>
+        </p:style>
+        <p:txBody>
+          <a:bodyPr rtlCol="0" anchor="ctr"/>
+          <a:lstStyle/>
+          <a:p>
+            <a:pPr algn="ctr"/>
+            <a:endParaRPr lang="en-US"/>
+          </a:p>
+        </p:txBody>
+      </p:sp>
+      <p:sp>
+        <p:nvSpPr>
+          <p:cNvPr id="27" name="Rectangle 18">
+            <a:extLst>
+              <a:ext uri="{FF2B5EF4-FFF2-40B4-BE49-F238E27FC236}">
+                <a16:creationId xmlns:a16="http://schemas.microsoft.com/office/drawing/2014/main" id="{1903E872-C07A-4030-B584-D321D40CABB6}"/>
+              </a:ext>
+              <a:ext uri="{C183D7F6-B498-43B3-948B-1728B52AA6E4}">
+                <adec:decorative xmlns:adec="http://schemas.microsoft.com/office/drawing/2017/decorative" val="1"/>
+              </a:ext>
+            </a:extLst>
+          </p:cNvPr>
+          <p:cNvSpPr>
+            <a:spLocks noGrp="1" noRot="1" noChangeAspect="1" noMove="1" noResize="1" noEditPoints="1" noAdjustHandles="1" noChangeArrowheads="1" noChangeShapeType="1" noTextEdit="1"/>
+          </p:cNvSpPr>
+          <p:nvPr>
+            <p:extLst>
+              <p:ext uri="{386F3935-93C4-4BCD-93E2-E3B085C9AB24}">
+                <p16:designElem xmlns:p16="http://schemas.microsoft.com/office/powerpoint/2015/main" val="1"/>
+              </p:ext>
+            </p:extLst>
+          </p:nvPr>
+        </p:nvSpPr>
+        <p:spPr>
+          <a:xfrm>
+            <a:off x="11626850" y="1"/>
+            <a:ext cx="565150" cy="6857999"/>
+          </a:xfrm>
+          <a:prstGeom prst="rect">
+            <a:avLst/>
+          </a:prstGeom>
+          <a:gradFill flip="none" rotWithShape="1">
+            <a:gsLst>
+              <a:gs pos="0">
+                <a:schemeClr val="accent1">
+                  <a:alpha val="50000"/>
+                </a:schemeClr>
+              </a:gs>
+              <a:gs pos="81000">
+                <a:schemeClr val="accent4">
+                  <a:alpha val="50000"/>
+                </a:schemeClr>
+              </a:gs>
+              <a:gs pos="25000">
+                <a:schemeClr val="accent2">
+                  <a:alpha val="60000"/>
+                </a:schemeClr>
+              </a:gs>
+              <a:gs pos="49000">
+                <a:schemeClr val="accent3">
+                  <a:alpha val="55000"/>
+                </a:schemeClr>
+              </a:gs>
+              <a:gs pos="99000">
+                <a:schemeClr val="accent5">
+                  <a:alpha val="50000"/>
+                </a:schemeClr>
+              </a:gs>
+            </a:gsLst>
+            <a:path path="circle">
+              <a:fillToRect r="100000" b="100000"/>
+            </a:path>
+            <a:tileRect l="-100000" t="-100000"/>
+          </a:gradFill>
+          <a:ln>
+            <a:noFill/>
+          </a:ln>
+        </p:spPr>
+        <p:style>
+          <a:lnRef idx="2">
+            <a:schemeClr val="accent1">
+              <a:shade val="50000"/>
+            </a:schemeClr>
+          </a:lnRef>
+          <a:fillRef idx="1">
+            <a:schemeClr val="accent1"/>
+          </a:fillRef>
+          <a:effectRef idx="0">
+            <a:schemeClr val="accent1"/>
+          </a:effectRef>
+          <a:fontRef idx="minor">
+            <a:schemeClr val="lt1"/>
+          </a:fontRef>
+        </p:style>
+        <p:txBody>
+          <a:bodyPr rtlCol="0" anchor="ctr"/>
+          <a:lstStyle/>
+          <a:p>
+            <a:pPr algn="ctr"/>
+            <a:endParaRPr lang="en-US"/>
+          </a:p>
+        </p:txBody>
+      </p:sp>
+      <p:sp>
+        <p:nvSpPr>
+          <p:cNvPr id="2" name="Title 1">
+            <a:extLst>
+              <a:ext uri="{FF2B5EF4-FFF2-40B4-BE49-F238E27FC236}">
+                <a16:creationId xmlns:a16="http://schemas.microsoft.com/office/drawing/2014/main" id="{67DB6A6C-C156-4B56-81E4-2FD9FCB623AF}"/>
+              </a:ext>
+            </a:extLst>
+          </p:cNvPr>
+          <p:cNvSpPr>
+            <a:spLocks noGrp="1"/>
+          </p:cNvSpPr>
+          <p:nvPr>
+            <p:ph type="title"/>
+          </p:nvPr>
+        </p:nvSpPr>
+        <p:spPr>
+          <a:xfrm>
+            <a:off x="566928" y="757451"/>
+            <a:ext cx="9626949" cy="1134452"/>
+          </a:xfrm>
+        </p:spPr>
+        <p:txBody>
+          <a:bodyPr vert="horz" lIns="91440" tIns="45720" rIns="91440" bIns="45720" rtlCol="0" anchor="ctr">
+            <a:normAutofit/>
+          </a:bodyPr>
+          <a:lstStyle/>
+          <a:p>
+            <a:r>
+              <a:rPr lang="en-US" sz="6000" dirty="0"/>
+              <a:t>Thanks for Stopping By!</a:t>
+            </a:r>
+          </a:p>
+        </p:txBody>
+      </p:sp>
+    </p:spTree>
+    <p:extLst>
+      <p:ext uri="{BB962C8B-B14F-4D97-AF65-F5344CB8AC3E}">
+        <p14:creationId xmlns:p14="http://schemas.microsoft.com/office/powerpoint/2010/main" val="513006035"/>
+      </p:ext>
+    </p:extLst>
+  </p:cSld>
+  <p:clrMapOvr>
+    <a:masterClrMapping/>
+  </p:clrMapOvr>
+  <p:timing>
+    <p:tnLst>
+      <p:par>
+        <p:cTn id="1" dur="indefinite" restart="never" nodeType="tmRoot">
+          <p:childTnLst>
+            <p:seq concurrent="1" nextAc="seek">
+              <p:cTn id="2" dur="indefinite" nodeType="mainSeq">
+                <p:childTnLst>
+                  <p:par>
+                    <p:cTn id="3" fill="hold">
+                      <p:stCondLst>
+                        <p:cond delay="indefinite"/>
+                      </p:stCondLst>
+                      <p:childTnLst>
+                        <p:par>
+                          <p:cTn id="4" fill="hold">
+                            <p:stCondLst>
+                              <p:cond delay="0"/>
+                            </p:stCondLst>
+                            <p:childTnLst>
+                              <p:par>
+                                <p:cTn id="5" presetID="1" presetClass="entr" presetSubtype="0" fill="hold" grpId="0" nodeType="clickEffect">
+                                  <p:stCondLst>
+                                    <p:cond delay="0"/>
+                                  </p:stCondLst>
+                                  <p:childTnLst>
+                                    <p:set>
+                                      <p:cBhvr>
+                                        <p:cTn id="6" dur="1" fill="hold">
+                                          <p:stCondLst>
+                                            <p:cond delay="0"/>
+                                          </p:stCondLst>
+                                        </p:cTn>
+                                        <p:tgtEl>
+                                          <p:spTgt spid="2"/>
+                                        </p:tgtEl>
+                                        <p:attrNameLst>
+                                          <p:attrName>style.visibility</p:attrName>
+                                        </p:attrNameLst>
+                                      </p:cBhvr>
+                                      <p:to>
+                                        <p:strVal val="visible"/>
+                                      </p:to>
+                                    </p:set>
+                                  </p:childTnLst>
+                                </p:cTn>
+                              </p:par>
+                            </p:childTnLst>
+                          </p:cTn>
+                        </p:par>
+                      </p:childTnLst>
+                    </p:cTn>
+                  </p:par>
+                </p:childTnLst>
+              </p:cTn>
+              <p:prevCondLst>
+                <p:cond evt="onPrev" delay="0">
+                  <p:tgtEl>
+                    <p:sldTgt/>
+                  </p:tgtEl>
+                </p:cond>
+              </p:prevCondLst>
+              <p:nextCondLst>
+                <p:cond evt="onNext" delay="0">
+                  <p:tgtEl>
+                    <p:sldTgt/>
+                  </p:tgtEl>
+                </p:cond>
+              </p:nextCondLst>
+            </p:seq>
+          </p:childTnLst>
+        </p:cTn>
+      </p:par>
+    </p:tnLst>
+    <p:bldLst>
+      <p:bldP spid="2" grpId="0"/>
     </p:bldLst>
   </p:timing>
 </p:sld>

</xml_diff>